<commit_message>
docs: revamp Git command notes presentation
- Update the Git command notes presentation.

Signed-off-by: longli <asd156428zxc@gmail.com>
</commit_message>
<xml_diff>
--- a/Git/Git command note.pptx
+++ b/Git/Git command note.pptx
@@ -12,8 +12,10 @@
     <p:sldId id="263" r:id="rId6"/>
     <p:sldId id="262" r:id="rId7"/>
     <p:sldId id="259" r:id="rId8"/>
-    <p:sldId id="264" r:id="rId9"/>
-    <p:sldId id="260" r:id="rId10"/>
+    <p:sldId id="265" r:id="rId9"/>
+    <p:sldId id="266" r:id="rId10"/>
+    <p:sldId id="264" r:id="rId11"/>
+    <p:sldId id="260" r:id="rId12"/>
   </p:sldIdLst>
   <p:sldSz cx="12192000" cy="6858000"/>
   <p:notesSz cx="6858000" cy="9144000"/>
@@ -267,7 +269,7 @@
           <a:p>
             <a:fld id="{925C6706-211F-4BEB-A3E9-6EC3BDFFB106}" type="datetimeFigureOut">
               <a:rPr lang="zh-TW" altLang="en-US" smtClean="0"/>
-              <a:t>2023/2/9</a:t>
+              <a:t>2025/8/15</a:t>
             </a:fld>
             <a:endParaRPr lang="zh-TW" altLang="en-US"/>
           </a:p>
@@ -465,7 +467,7 @@
           <a:p>
             <a:fld id="{925C6706-211F-4BEB-A3E9-6EC3BDFFB106}" type="datetimeFigureOut">
               <a:rPr lang="zh-TW" altLang="en-US" smtClean="0"/>
-              <a:t>2023/2/9</a:t>
+              <a:t>2025/8/15</a:t>
             </a:fld>
             <a:endParaRPr lang="zh-TW" altLang="en-US"/>
           </a:p>
@@ -673,7 +675,7 @@
           <a:p>
             <a:fld id="{925C6706-211F-4BEB-A3E9-6EC3BDFFB106}" type="datetimeFigureOut">
               <a:rPr lang="zh-TW" altLang="en-US" smtClean="0"/>
-              <a:t>2023/2/9</a:t>
+              <a:t>2025/8/15</a:t>
             </a:fld>
             <a:endParaRPr lang="zh-TW" altLang="en-US"/>
           </a:p>
@@ -871,7 +873,7 @@
           <a:p>
             <a:fld id="{925C6706-211F-4BEB-A3E9-6EC3BDFFB106}" type="datetimeFigureOut">
               <a:rPr lang="zh-TW" altLang="en-US" smtClean="0"/>
-              <a:t>2023/2/9</a:t>
+              <a:t>2025/8/15</a:t>
             </a:fld>
             <a:endParaRPr lang="zh-TW" altLang="en-US"/>
           </a:p>
@@ -1146,7 +1148,7 @@
           <a:p>
             <a:fld id="{925C6706-211F-4BEB-A3E9-6EC3BDFFB106}" type="datetimeFigureOut">
               <a:rPr lang="zh-TW" altLang="en-US" smtClean="0"/>
-              <a:t>2023/2/9</a:t>
+              <a:t>2025/8/15</a:t>
             </a:fld>
             <a:endParaRPr lang="zh-TW" altLang="en-US"/>
           </a:p>
@@ -1411,7 +1413,7 @@
           <a:p>
             <a:fld id="{925C6706-211F-4BEB-A3E9-6EC3BDFFB106}" type="datetimeFigureOut">
               <a:rPr lang="zh-TW" altLang="en-US" smtClean="0"/>
-              <a:t>2023/2/9</a:t>
+              <a:t>2025/8/15</a:t>
             </a:fld>
             <a:endParaRPr lang="zh-TW" altLang="en-US"/>
           </a:p>
@@ -1823,7 +1825,7 @@
           <a:p>
             <a:fld id="{925C6706-211F-4BEB-A3E9-6EC3BDFFB106}" type="datetimeFigureOut">
               <a:rPr lang="zh-TW" altLang="en-US" smtClean="0"/>
-              <a:t>2023/2/9</a:t>
+              <a:t>2025/8/15</a:t>
             </a:fld>
             <a:endParaRPr lang="zh-TW" altLang="en-US"/>
           </a:p>
@@ -1964,7 +1966,7 @@
           <a:p>
             <a:fld id="{925C6706-211F-4BEB-A3E9-6EC3BDFFB106}" type="datetimeFigureOut">
               <a:rPr lang="zh-TW" altLang="en-US" smtClean="0"/>
-              <a:t>2023/2/9</a:t>
+              <a:t>2025/8/15</a:t>
             </a:fld>
             <a:endParaRPr lang="zh-TW" altLang="en-US"/>
           </a:p>
@@ -2077,7 +2079,7 @@
           <a:p>
             <a:fld id="{925C6706-211F-4BEB-A3E9-6EC3BDFFB106}" type="datetimeFigureOut">
               <a:rPr lang="zh-TW" altLang="en-US" smtClean="0"/>
-              <a:t>2023/2/9</a:t>
+              <a:t>2025/8/15</a:t>
             </a:fld>
             <a:endParaRPr lang="zh-TW" altLang="en-US"/>
           </a:p>
@@ -2388,7 +2390,7 @@
           <a:p>
             <a:fld id="{925C6706-211F-4BEB-A3E9-6EC3BDFFB106}" type="datetimeFigureOut">
               <a:rPr lang="zh-TW" altLang="en-US" smtClean="0"/>
-              <a:t>2023/2/9</a:t>
+              <a:t>2025/8/15</a:t>
             </a:fld>
             <a:endParaRPr lang="zh-TW" altLang="en-US"/>
           </a:p>
@@ -2676,7 +2678,7 @@
           <a:p>
             <a:fld id="{925C6706-211F-4BEB-A3E9-6EC3BDFFB106}" type="datetimeFigureOut">
               <a:rPr lang="zh-TW" altLang="en-US" smtClean="0"/>
-              <a:t>2023/2/9</a:t>
+              <a:t>2025/8/15</a:t>
             </a:fld>
             <a:endParaRPr lang="zh-TW" altLang="en-US"/>
           </a:p>
@@ -2917,7 +2919,7 @@
           <a:p>
             <a:fld id="{925C6706-211F-4BEB-A3E9-6EC3BDFFB106}" type="datetimeFigureOut">
               <a:rPr lang="zh-TW" altLang="en-US" smtClean="0"/>
-              <a:t>2023/2/9</a:t>
+              <a:t>2025/8/15</a:t>
             </a:fld>
             <a:endParaRPr lang="zh-TW" altLang="en-US"/>
           </a:p>
@@ -3376,6 +3378,284 @@
 </p:sld>
 </file>
 
+<file path=ppt/slides/slide10.xml><?xml version="1.0" encoding="utf-8"?>
+<p:sld xmlns:a="http://schemas.openxmlformats.org/drawingml/2006/main" xmlns:r="http://schemas.openxmlformats.org/officeDocument/2006/relationships" xmlns:p="http://schemas.openxmlformats.org/presentationml/2006/main">
+  <p:cSld>
+    <p:spTree>
+      <p:nvGrpSpPr>
+        <p:cNvPr id="1" name=""/>
+        <p:cNvGrpSpPr/>
+        <p:nvPr/>
+      </p:nvGrpSpPr>
+      <p:grpSpPr>
+        <a:xfrm>
+          <a:off x="0" y="0"/>
+          <a:ext cx="0" cy="0"/>
+          <a:chOff x="0" y="0"/>
+          <a:chExt cx="0" cy="0"/>
+        </a:xfrm>
+      </p:grpSpPr>
+      <p:sp>
+        <p:nvSpPr>
+          <p:cNvPr id="3" name="內容版面配置區 2">
+            <a:extLst>
+              <a:ext uri="{FF2B5EF4-FFF2-40B4-BE49-F238E27FC236}">
+                <a16:creationId xmlns:a16="http://schemas.microsoft.com/office/drawing/2014/main" id="{56ADED76-6798-A6A2-6E2B-9A221D0A7319}"/>
+              </a:ext>
+            </a:extLst>
+          </p:cNvPr>
+          <p:cNvSpPr>
+            <a:spLocks noGrp="1"/>
+          </p:cNvSpPr>
+          <p:nvPr>
+            <p:ph idx="1"/>
+          </p:nvPr>
+        </p:nvSpPr>
+        <p:spPr/>
+        <p:txBody>
+          <a:bodyPr/>
+          <a:lstStyle/>
+          <a:p>
+            <a:r>
+              <a:rPr lang="en-US" altLang="zh-TW" dirty="0"/>
+              <a:t>Touch .</a:t>
+            </a:r>
+            <a:r>
+              <a:rPr lang="en-US" altLang="zh-TW" dirty="0" err="1"/>
+              <a:t>gitignore</a:t>
+            </a:r>
+            <a:r>
+              <a:rPr lang="en-US" altLang="zh-TW" dirty="0"/>
+              <a:t> </a:t>
+            </a:r>
+          </a:p>
+          <a:p>
+            <a:r>
+              <a:rPr lang="en-US" altLang="zh-TW" dirty="0"/>
+              <a:t>Vim .</a:t>
+            </a:r>
+            <a:r>
+              <a:rPr lang="en-US" altLang="zh-TW" dirty="0" err="1"/>
+              <a:t>gitignore</a:t>
+            </a:r>
+            <a:endParaRPr lang="en-US" altLang="zh-TW" dirty="0"/>
+          </a:p>
+          <a:p>
+            <a:endParaRPr lang="zh-TW" altLang="en-US" dirty="0"/>
+          </a:p>
+        </p:txBody>
+      </p:sp>
+      <p:sp>
+        <p:nvSpPr>
+          <p:cNvPr id="4" name="Rectangle 1">
+            <a:extLst>
+              <a:ext uri="{FF2B5EF4-FFF2-40B4-BE49-F238E27FC236}">
+                <a16:creationId xmlns:a16="http://schemas.microsoft.com/office/drawing/2014/main" id="{47AE0D64-E7AB-30F6-D3FB-84D7AF80A6C6}"/>
+              </a:ext>
+            </a:extLst>
+          </p:cNvPr>
+          <p:cNvSpPr>
+            <a:spLocks noGrp="1" noChangeArrowheads="1"/>
+          </p:cNvSpPr>
+          <p:nvPr>
+            <p:ph type="title"/>
+          </p:nvPr>
+        </p:nvSpPr>
+        <p:spPr bwMode="auto">
+          <a:xfrm>
+            <a:off x="838200" y="723208"/>
+            <a:ext cx="11118011" cy="609398"/>
+          </a:xfrm>
+          <a:prstGeom prst="rect">
+            <a:avLst/>
+          </a:prstGeom>
+          <a:noFill/>
+          <a:ln>
+            <a:noFill/>
+          </a:ln>
+          <a:effectLst/>
+          <a:extLst>
+            <a:ext uri="{909E8E84-426E-40DD-AFC4-6F175D3DCCD1}">
+              <a14:hiddenFill xmlns:a14="http://schemas.microsoft.com/office/drawing/2010/main">
+                <a:solidFill>
+                  <a:schemeClr val="accent1"/>
+                </a:solidFill>
+              </a14:hiddenFill>
+            </a:ext>
+            <a:ext uri="{91240B29-F687-4F45-9708-019B960494DF}">
+              <a14:hiddenLine xmlns:a14="http://schemas.microsoft.com/office/drawing/2010/main" w="9525">
+                <a:solidFill>
+                  <a:schemeClr val="tx1"/>
+                </a:solidFill>
+                <a:miter lim="800000"/>
+                <a:headEnd/>
+                <a:tailEnd/>
+              </a14:hiddenLine>
+            </a:ext>
+            <a:ext uri="{AF507438-7753-43E0-B8FC-AC1667EBCBE1}">
+              <a14:hiddenEffects xmlns:a14="http://schemas.microsoft.com/office/drawing/2010/main">
+                <a:effectLst>
+                  <a:outerShdw dist="35921" dir="2700000" algn="ctr" rotWithShape="0">
+                    <a:schemeClr val="bg2"/>
+                  </a:outerShdw>
+                </a:effectLst>
+              </a14:hiddenEffects>
+            </a:ext>
+          </a:extLst>
+        </p:spPr>
+        <p:txBody>
+          <a:bodyPr vert="horz" wrap="square" lIns="0" tIns="0" rIns="0" bIns="0" numCol="1" anchor="ctr" anchorCtr="0" compatLnSpc="1">
+            <a:prstTxWarp prst="textNoShape">
+              <a:avLst/>
+            </a:prstTxWarp>
+            <a:spAutoFit/>
+          </a:bodyPr>
+          <a:lstStyle/>
+          <a:p>
+            <a:pPr fontAlgn="base">
+              <a:spcAft>
+                <a:spcPct val="0"/>
+              </a:spcAft>
+            </a:pPr>
+            <a:r>
+              <a:rPr lang="zh-TW" altLang="zh-TW" b="1" dirty="0">
+                <a:solidFill>
+                  <a:srgbClr val="FF0000"/>
+                </a:solidFill>
+                <a:latin typeface="??"/>
+              </a:rPr>
+              <a:t>.gitignore</a:t>
+            </a:r>
+            <a:r>
+              <a:rPr lang="en-US" altLang="zh-TW" dirty="0"/>
+              <a:t>(</a:t>
+            </a:r>
+            <a:r>
+              <a:rPr lang="zh-TW" altLang="en-US" dirty="0"/>
+              <a:t>將排除檔案寫入</a:t>
+            </a:r>
+            <a:r>
+              <a:rPr lang="en-US" altLang="zh-TW" dirty="0"/>
+              <a:t>)</a:t>
+            </a:r>
+            <a:endParaRPr lang="zh-TW" altLang="zh-TW" b="1" dirty="0">
+              <a:solidFill>
+                <a:srgbClr val="FF0000"/>
+              </a:solidFill>
+              <a:latin typeface="??"/>
+            </a:endParaRPr>
+          </a:p>
+        </p:txBody>
+      </p:sp>
+    </p:spTree>
+    <p:extLst>
+      <p:ext uri="{BB962C8B-B14F-4D97-AF65-F5344CB8AC3E}">
+        <p14:creationId xmlns:p14="http://schemas.microsoft.com/office/powerpoint/2010/main" val="2741975442"/>
+      </p:ext>
+    </p:extLst>
+  </p:cSld>
+  <p:clrMapOvr>
+    <a:masterClrMapping/>
+  </p:clrMapOvr>
+</p:sld>
+</file>
+
+<file path=ppt/slides/slide11.xml><?xml version="1.0" encoding="utf-8"?>
+<p:sld xmlns:a="http://schemas.openxmlformats.org/drawingml/2006/main" xmlns:r="http://schemas.openxmlformats.org/officeDocument/2006/relationships" xmlns:p="http://schemas.openxmlformats.org/presentationml/2006/main">
+  <p:cSld>
+    <p:spTree>
+      <p:nvGrpSpPr>
+        <p:cNvPr id="1" name=""/>
+        <p:cNvGrpSpPr/>
+        <p:nvPr/>
+      </p:nvGrpSpPr>
+      <p:grpSpPr>
+        <a:xfrm>
+          <a:off x="0" y="0"/>
+          <a:ext cx="0" cy="0"/>
+          <a:chOff x="0" y="0"/>
+          <a:chExt cx="0" cy="0"/>
+        </a:xfrm>
+      </p:grpSpPr>
+      <p:sp>
+        <p:nvSpPr>
+          <p:cNvPr id="2" name="標題 1">
+            <a:extLst>
+              <a:ext uri="{FF2B5EF4-FFF2-40B4-BE49-F238E27FC236}">
+                <a16:creationId xmlns:a16="http://schemas.microsoft.com/office/drawing/2014/main" id="{830EEABA-0401-7883-248D-35E5DE3B5AC5}"/>
+              </a:ext>
+            </a:extLst>
+          </p:cNvPr>
+          <p:cNvSpPr>
+            <a:spLocks noGrp="1"/>
+          </p:cNvSpPr>
+          <p:nvPr>
+            <p:ph type="title"/>
+          </p:nvPr>
+        </p:nvSpPr>
+        <p:spPr/>
+        <p:txBody>
+          <a:bodyPr>
+            <a:normAutofit/>
+          </a:bodyPr>
+          <a:lstStyle/>
+          <a:p>
+            <a:r>
+              <a:rPr lang="en-US" altLang="zh-TW" b="1" dirty="0">
+                <a:solidFill>
+                  <a:srgbClr val="FF0000"/>
+                </a:solidFill>
+                <a:latin typeface="??"/>
+              </a:rPr>
+              <a:t>merge</a:t>
+            </a:r>
+            <a:endParaRPr lang="zh-TW" altLang="en-US" b="1" dirty="0">
+              <a:solidFill>
+                <a:srgbClr val="FF0000"/>
+              </a:solidFill>
+              <a:latin typeface="??"/>
+            </a:endParaRPr>
+          </a:p>
+        </p:txBody>
+      </p:sp>
+      <p:sp>
+        <p:nvSpPr>
+          <p:cNvPr id="3" name="內容版面配置區 2">
+            <a:extLst>
+              <a:ext uri="{FF2B5EF4-FFF2-40B4-BE49-F238E27FC236}">
+                <a16:creationId xmlns:a16="http://schemas.microsoft.com/office/drawing/2014/main" id="{8917B8D9-3723-A924-2ADB-8C69701D294A}"/>
+              </a:ext>
+            </a:extLst>
+          </p:cNvPr>
+          <p:cNvSpPr>
+            <a:spLocks noGrp="1"/>
+          </p:cNvSpPr>
+          <p:nvPr>
+            <p:ph idx="1"/>
+          </p:nvPr>
+        </p:nvSpPr>
+        <p:spPr/>
+        <p:txBody>
+          <a:bodyPr/>
+          <a:lstStyle/>
+          <a:p>
+            <a:endParaRPr lang="zh-TW" altLang="en-US"/>
+          </a:p>
+        </p:txBody>
+      </p:sp>
+    </p:spTree>
+    <p:extLst>
+      <p:ext uri="{BB962C8B-B14F-4D97-AF65-F5344CB8AC3E}">
+        <p14:creationId xmlns:p14="http://schemas.microsoft.com/office/powerpoint/2010/main" val="3581050373"/>
+      </p:ext>
+    </p:extLst>
+  </p:cSld>
+  <p:clrMapOvr>
+    <a:masterClrMapping/>
+  </p:clrMapOvr>
+</p:sld>
+</file>
+
 <file path=ppt/slides/slide2.xml><?xml version="1.0" encoding="utf-8"?>
 <p:sld xmlns:a="http://schemas.openxmlformats.org/drawingml/2006/main" xmlns:r="http://schemas.openxmlformats.org/officeDocument/2006/relationships" xmlns:p="http://schemas.openxmlformats.org/presentationml/2006/main">
   <p:cSld>
@@ -5021,10 +5301,47 @@
       </p:grpSpPr>
       <p:sp>
         <p:nvSpPr>
+          <p:cNvPr id="2" name="標題 1">
+            <a:extLst>
+              <a:ext uri="{FF2B5EF4-FFF2-40B4-BE49-F238E27FC236}">
+                <a16:creationId xmlns:a16="http://schemas.microsoft.com/office/drawing/2014/main" id="{9AEDCA1D-8192-5F09-43BB-D581AD8B406D}"/>
+              </a:ext>
+            </a:extLst>
+          </p:cNvPr>
+          <p:cNvSpPr>
+            <a:spLocks noGrp="1"/>
+          </p:cNvSpPr>
+          <p:nvPr>
+            <p:ph type="title"/>
+          </p:nvPr>
+        </p:nvSpPr>
+        <p:spPr/>
+        <p:txBody>
+          <a:bodyPr/>
+          <a:lstStyle/>
+          <a:p>
+            <a:r>
+              <a:rPr kumimoji="1" lang="en-US" altLang="zh-TW" dirty="0">
+                <a:solidFill>
+                  <a:srgbClr val="FF0000"/>
+                </a:solidFill>
+              </a:rPr>
+              <a:t>SSH</a:t>
+            </a:r>
+            <a:endParaRPr kumimoji="1" lang="zh-TW" altLang="en-US" dirty="0">
+              <a:solidFill>
+                <a:srgbClr val="FF0000"/>
+              </a:solidFill>
+            </a:endParaRPr>
+          </a:p>
+        </p:txBody>
+      </p:sp>
+      <p:sp>
+        <p:nvSpPr>
           <p:cNvPr id="3" name="內容版面配置區 2">
             <a:extLst>
               <a:ext uri="{FF2B5EF4-FFF2-40B4-BE49-F238E27FC236}">
-                <a16:creationId xmlns:a16="http://schemas.microsoft.com/office/drawing/2014/main" id="{56ADED76-6798-A6A2-6E2B-9A221D0A7319}"/>
+                <a16:creationId xmlns:a16="http://schemas.microsoft.com/office/drawing/2014/main" id="{A99EAC8A-A842-6BEE-05D5-AD84DDBE7AC7}"/>
               </a:ext>
             </a:extLst>
           </p:cNvPr>
@@ -5035,146 +5352,140 @@
             <p:ph idx="1"/>
           </p:nvPr>
         </p:nvSpPr>
-        <p:spPr/>
-        <p:txBody>
-          <a:bodyPr/>
-          <a:lstStyle/>
-          <a:p>
-            <a:r>
-              <a:rPr lang="en-US" altLang="zh-TW" dirty="0"/>
-              <a:t>Touch .</a:t>
-            </a:r>
-            <a:r>
-              <a:rPr lang="en-US" altLang="zh-TW" dirty="0" err="1"/>
-              <a:t>gitignore</a:t>
-            </a:r>
-            <a:r>
-              <a:rPr lang="en-US" altLang="zh-TW" dirty="0"/>
-              <a:t> </a:t>
-            </a:r>
-          </a:p>
-          <a:p>
-            <a:r>
-              <a:rPr lang="en-US" altLang="zh-TW" dirty="0"/>
-              <a:t>Vim .</a:t>
-            </a:r>
-            <a:r>
-              <a:rPr lang="en-US" altLang="zh-TW" dirty="0" err="1"/>
-              <a:t>gitignore</a:t>
-            </a:r>
-            <a:endParaRPr lang="en-US" altLang="zh-TW" dirty="0"/>
-          </a:p>
-          <a:p>
-            <a:endParaRPr lang="zh-TW" altLang="en-US" dirty="0"/>
-          </a:p>
-        </p:txBody>
-      </p:sp>
-      <p:sp>
-        <p:nvSpPr>
-          <p:cNvPr id="4" name="Rectangle 1">
-            <a:extLst>
-              <a:ext uri="{FF2B5EF4-FFF2-40B4-BE49-F238E27FC236}">
-                <a16:creationId xmlns:a16="http://schemas.microsoft.com/office/drawing/2014/main" id="{47AE0D64-E7AB-30F6-D3FB-84D7AF80A6C6}"/>
-              </a:ext>
-            </a:extLst>
-          </p:cNvPr>
-          <p:cNvSpPr>
-            <a:spLocks noGrp="1" noChangeArrowheads="1"/>
-          </p:cNvSpPr>
-          <p:nvPr>
-            <p:ph type="title"/>
-          </p:nvPr>
-        </p:nvSpPr>
-        <p:spPr bwMode="auto">
+        <p:spPr>
           <a:xfrm>
-            <a:off x="838200" y="723208"/>
-            <a:ext cx="11118011" cy="609398"/>
+            <a:off x="838200" y="1754529"/>
+            <a:ext cx="10515600" cy="4351338"/>
+          </a:xfrm>
+        </p:spPr>
+        <p:txBody>
+          <a:bodyPr/>
+          <a:lstStyle/>
+          <a:p>
+            <a:r>
+              <a:rPr lang="en" altLang="zh-TW" dirty="0"/>
+              <a:t>ssh-keygen -t </a:t>
+            </a:r>
+            <a:r>
+              <a:rPr lang="en" altLang="zh-TW" dirty="0" err="1"/>
+              <a:t>rsa</a:t>
+            </a:r>
+            <a:r>
+              <a:rPr lang="en" altLang="zh-TW" dirty="0"/>
+              <a:t> -b 4096 -C "</a:t>
+            </a:r>
+            <a:r>
+              <a:rPr lang="en" altLang="zh-TW" dirty="0" err="1"/>
+              <a:t>your_email@example.com</a:t>
+            </a:r>
+            <a:r>
+              <a:rPr lang="en" altLang="zh-TW" dirty="0"/>
+              <a:t>"</a:t>
+            </a:r>
+          </a:p>
+          <a:p>
+            <a:r>
+              <a:rPr lang="en" altLang="zh-TW" dirty="0"/>
+              <a:t>cd .ssh</a:t>
+            </a:r>
+          </a:p>
+          <a:p>
+            <a:r>
+              <a:rPr lang="en" altLang="zh-TW" dirty="0"/>
+              <a:t>Ls</a:t>
+            </a:r>
+          </a:p>
+          <a:p>
+            <a:r>
+              <a:rPr lang="en" altLang="zh-TW" dirty="0"/>
+              <a:t>cat </a:t>
+            </a:r>
+            <a:r>
+              <a:rPr lang="en" altLang="zh-TW" dirty="0" err="1"/>
+              <a:t>id_rsa.pub</a:t>
+            </a:r>
+            <a:br>
+              <a:rPr lang="en" altLang="zh-TW" dirty="0"/>
+            </a:br>
+            <a:endParaRPr kumimoji="1" lang="zh-TW" altLang="en-US" dirty="0"/>
+          </a:p>
+        </p:txBody>
+      </p:sp>
+      <p:sp>
+        <p:nvSpPr>
+          <p:cNvPr id="5" name="文字方塊 4">
+            <a:extLst>
+              <a:ext uri="{FF2B5EF4-FFF2-40B4-BE49-F238E27FC236}">
+                <a16:creationId xmlns:a16="http://schemas.microsoft.com/office/drawing/2014/main" id="{B1813FEC-37F4-B27F-E240-9D59ECC33001}"/>
+              </a:ext>
+            </a:extLst>
+          </p:cNvPr>
+          <p:cNvSpPr txBox="1"/>
+          <p:nvPr/>
+        </p:nvSpPr>
+        <p:spPr>
+          <a:xfrm>
+            <a:off x="838200" y="6169709"/>
+            <a:ext cx="11038952" cy="646331"/>
           </a:xfrm>
           <a:prstGeom prst="rect">
             <a:avLst/>
           </a:prstGeom>
           <a:noFill/>
-          <a:ln>
-            <a:noFill/>
-          </a:ln>
-          <a:effectLst/>
-          <a:extLst>
-            <a:ext uri="{909E8E84-426E-40DD-AFC4-6F175D3DCCD1}">
-              <a14:hiddenFill xmlns:a14="http://schemas.microsoft.com/office/drawing/2010/main">
-                <a:solidFill>
-                  <a:schemeClr val="accent1"/>
-                </a:solidFill>
-              </a14:hiddenFill>
-            </a:ext>
-            <a:ext uri="{91240B29-F687-4F45-9708-019B960494DF}">
-              <a14:hiddenLine xmlns:a14="http://schemas.microsoft.com/office/drawing/2010/main" w="9525">
-                <a:solidFill>
-                  <a:schemeClr val="tx1"/>
-                </a:solidFill>
-                <a:miter lim="800000"/>
-                <a:headEnd/>
-                <a:tailEnd/>
-              </a14:hiddenLine>
-            </a:ext>
-            <a:ext uri="{AF507438-7753-43E0-B8FC-AC1667EBCBE1}">
-              <a14:hiddenEffects xmlns:a14="http://schemas.microsoft.com/office/drawing/2010/main">
-                <a:effectLst>
-                  <a:outerShdw dist="35921" dir="2700000" algn="ctr" rotWithShape="0">
-                    <a:schemeClr val="bg2"/>
-                  </a:outerShdw>
-                </a:effectLst>
-              </a14:hiddenEffects>
-            </a:ext>
-          </a:extLst>
         </p:spPr>
         <p:txBody>
-          <a:bodyPr vert="horz" wrap="square" lIns="0" tIns="0" rIns="0" bIns="0" numCol="1" anchor="ctr" anchorCtr="0" compatLnSpc="1">
-            <a:prstTxWarp prst="textNoShape">
-              <a:avLst/>
-            </a:prstTxWarp>
+          <a:bodyPr wrap="square">
             <a:spAutoFit/>
           </a:bodyPr>
           <a:lstStyle/>
           <a:p>
-            <a:pPr fontAlgn="base">
-              <a:spcAft>
-                <a:spcPct val="0"/>
-              </a:spcAft>
-            </a:pPr>
-            <a:r>
-              <a:rPr lang="zh-TW" altLang="zh-TW" b="1" dirty="0">
-                <a:solidFill>
-                  <a:srgbClr val="FF0000"/>
-                </a:solidFill>
-                <a:latin typeface="??"/>
-              </a:rPr>
-              <a:t>.gitignore</a:t>
-            </a:r>
-            <a:r>
-              <a:rPr lang="en-US" altLang="zh-TW" dirty="0"/>
-              <a:t>(</a:t>
-            </a:r>
             <a:r>
               <a:rPr lang="zh-TW" altLang="en-US" dirty="0"/>
-              <a:t>將排除檔案寫入</a:t>
-            </a:r>
-            <a:r>
-              <a:rPr lang="en-US" altLang="zh-TW" dirty="0"/>
-              <a:t>)</a:t>
-            </a:r>
-            <a:endParaRPr lang="zh-TW" altLang="zh-TW" b="1" dirty="0">
-              <a:solidFill>
-                <a:srgbClr val="FF0000"/>
-              </a:solidFill>
-              <a:latin typeface="??"/>
-            </a:endParaRPr>
-          </a:p>
-        </p:txBody>
-      </p:sp>
+              <a:t>https://medium.com/@1chooo/%E8%B8%8F%E5%85%A5-git-%E7%9A%84%E4%B8%96%E7%95%8C-%E4%BD%BF%E7%94%A8-ssh-%E8%88%87-github-%E9%80%A3%E7%B7%9A-7324b01349dd</a:t>
+            </a:r>
+          </a:p>
+        </p:txBody>
+      </p:sp>
+      <p:pic>
+        <p:nvPicPr>
+          <p:cNvPr id="7" name="圖片 6" descr="一張含有 文字, 螢幕擷取畫面, 軟體, 多媒體軟體 的圖片&#10;&#10;AI 產生的內容可能不正確。">
+            <a:extLst>
+              <a:ext uri="{FF2B5EF4-FFF2-40B4-BE49-F238E27FC236}">
+                <a16:creationId xmlns:a16="http://schemas.microsoft.com/office/drawing/2014/main" id="{E86EE6D8-5AC4-C0F8-D140-BA17CCC7A5DF}"/>
+              </a:ext>
+            </a:extLst>
+          </p:cNvPr>
+          <p:cNvPicPr>
+            <a:picLocks noChangeAspect="1"/>
+          </p:cNvPicPr>
+          <p:nvPr/>
+        </p:nvPicPr>
+        <p:blipFill>
+          <a:blip r:embed="rId2">
+            <a:extLst>
+              <a:ext uri="{28A0092B-C50C-407E-A947-70E740481C1C}">
+                <a14:useLocalDpi xmlns:a14="http://schemas.microsoft.com/office/drawing/2010/main" val="0"/>
+              </a:ext>
+            </a:extLst>
+          </a:blip>
+          <a:stretch>
+            <a:fillRect/>
+          </a:stretch>
+        </p:blipFill>
+        <p:spPr>
+          <a:xfrm>
+            <a:off x="6551525" y="2321238"/>
+            <a:ext cx="5640475" cy="3551975"/>
+          </a:xfrm>
+          <a:prstGeom prst="rect">
+            <a:avLst/>
+          </a:prstGeom>
+        </p:spPr>
+      </p:pic>
     </p:spTree>
     <p:extLst>
       <p:ext uri="{BB962C8B-B14F-4D97-AF65-F5344CB8AC3E}">
-        <p14:creationId xmlns:p14="http://schemas.microsoft.com/office/powerpoint/2010/main" val="2741975442"/>
+        <p14:creationId xmlns:p14="http://schemas.microsoft.com/office/powerpoint/2010/main" val="1205251237"/>
       </p:ext>
     </p:extLst>
   </p:cSld>
@@ -5206,7 +5517,7 @@
           <p:cNvPr id="2" name="標題 1">
             <a:extLst>
               <a:ext uri="{FF2B5EF4-FFF2-40B4-BE49-F238E27FC236}">
-                <a16:creationId xmlns:a16="http://schemas.microsoft.com/office/drawing/2014/main" id="{830EEABA-0401-7883-248D-35E5DE3B5AC5}"/>
+                <a16:creationId xmlns:a16="http://schemas.microsoft.com/office/drawing/2014/main" id="{FA17FE97-A8D3-761B-2260-CCAF018F4D93}"/>
               </a:ext>
             </a:extLst>
           </p:cNvPr>
@@ -5219,25 +5530,21 @@
         </p:nvSpPr>
         <p:spPr/>
         <p:txBody>
-          <a:bodyPr>
-            <a:normAutofit/>
-          </a:bodyPr>
-          <a:lstStyle/>
-          <a:p>
-            <a:r>
-              <a:rPr lang="en-US" altLang="zh-TW" b="1" dirty="0">
+          <a:bodyPr/>
+          <a:lstStyle/>
+          <a:p>
+            <a:r>
+              <a:rPr kumimoji="1" lang="en-US" altLang="zh-TW" dirty="0">
                 <a:solidFill>
                   <a:srgbClr val="FF0000"/>
                 </a:solidFill>
-                <a:latin typeface="??"/>
               </a:rPr>
-              <a:t>merge</a:t>
-            </a:r>
-            <a:endParaRPr lang="zh-TW" altLang="en-US" b="1" dirty="0">
+              <a:t>config</a:t>
+            </a:r>
+            <a:endParaRPr kumimoji="1" lang="zh-TW" altLang="en-US" dirty="0">
               <a:solidFill>
                 <a:srgbClr val="FF0000"/>
               </a:solidFill>
-              <a:latin typeface="??"/>
             </a:endParaRPr>
           </a:p>
         </p:txBody>
@@ -5247,7 +5554,7 @@
           <p:cNvPr id="3" name="內容版面配置區 2">
             <a:extLst>
               <a:ext uri="{FF2B5EF4-FFF2-40B4-BE49-F238E27FC236}">
-                <a16:creationId xmlns:a16="http://schemas.microsoft.com/office/drawing/2014/main" id="{8917B8D9-3723-A924-2ADB-8C69701D294A}"/>
+                <a16:creationId xmlns:a16="http://schemas.microsoft.com/office/drawing/2014/main" id="{46916201-91A1-2CE1-EB32-DC4014070F22}"/>
               </a:ext>
             </a:extLst>
           </p:cNvPr>
@@ -5263,14 +5570,56 @@
           <a:bodyPr/>
           <a:lstStyle/>
           <a:p>
-            <a:endParaRPr lang="zh-TW" altLang="en-US"/>
+            <a:r>
+              <a:rPr lang="en" altLang="zh-TW" dirty="0"/>
+              <a:t>git config --list</a:t>
+            </a:r>
+          </a:p>
+          <a:p>
+            <a:endParaRPr lang="en" altLang="zh-TW" dirty="0"/>
+          </a:p>
+          <a:p>
+            <a:r>
+              <a:rPr lang="en" altLang="zh-TW" dirty="0"/>
+              <a:t>git config --global </a:t>
+            </a:r>
+            <a:r>
+              <a:rPr lang="en" altLang="zh-TW" dirty="0" err="1"/>
+              <a:t>user.name</a:t>
+            </a:r>
+            <a:r>
+              <a:rPr lang="en" altLang="zh-TW" dirty="0"/>
+              <a:t> "John Doe"</a:t>
+            </a:r>
+          </a:p>
+          <a:p>
+            <a:r>
+              <a:rPr lang="en" altLang="zh-TW" dirty="0"/>
+              <a:t>git config --global </a:t>
+            </a:r>
+            <a:r>
+              <a:rPr lang="en" altLang="zh-TW" dirty="0" err="1"/>
+              <a:t>user.email</a:t>
+            </a:r>
+            <a:r>
+              <a:rPr lang="en" altLang="zh-TW" dirty="0"/>
+              <a:t> </a:t>
+            </a:r>
+            <a:r>
+              <a:rPr lang="en" altLang="zh-TW" dirty="0" err="1"/>
+              <a:t>johndoe@example.com</a:t>
+            </a:r>
+            <a:endParaRPr lang="en" altLang="zh-TW" dirty="0"/>
+          </a:p>
+          <a:p>
+            <a:endParaRPr kumimoji="1" lang="zh-TW" altLang="en-US" dirty="0"/>
           </a:p>
         </p:txBody>
       </p:sp>
     </p:spTree>
     <p:extLst>
       <p:ext uri="{BB962C8B-B14F-4D97-AF65-F5344CB8AC3E}">
-        <p14:creationId xmlns:p14="http://schemas.microsoft.com/office/powerpoint/2010/main" val="3581050373"/>
+        <p14:creationId xmlns:p14="http://schemas.microsoft.com/office/powerpoint/2010/main" val="3503275711"/>
       </p:ext>
     </p:extLst>
   </p:cSld>

</xml_diff>

<commit_message>
docs: update Git command note presentation
- Updated the Git command note presentation

Signed-off-by: longli <asd156428zxc@gmail.com>
</commit_message>
<xml_diff>
--- a/Git/Git command note.pptx
+++ b/Git/Git command note.pptx
@@ -5354,8 +5354,8 @@
         </p:nvSpPr>
         <p:spPr>
           <a:xfrm>
-            <a:off x="838200" y="1754529"/>
-            <a:ext cx="10515600" cy="4351338"/>
+            <a:off x="838200" y="1366576"/>
+            <a:ext cx="10515600" cy="4739291"/>
           </a:xfrm>
         </p:spPr>
         <p:txBody>
@@ -5363,20 +5363,35 @@
           <a:lstStyle/>
           <a:p>
             <a:r>
+              <a:rPr lang="en" altLang="zh-TW" strike="sngStrike" dirty="0"/>
+              <a:t>ssh-keygen -t </a:t>
+            </a:r>
+            <a:r>
+              <a:rPr lang="en" altLang="zh-TW" strike="sngStrike" dirty="0" err="1"/>
+              <a:t>rsa</a:t>
+            </a:r>
+            <a:r>
+              <a:rPr lang="en" altLang="zh-TW" strike="sngStrike" dirty="0"/>
+              <a:t> -b 4096 -C </a:t>
+            </a:r>
+            <a:r>
+              <a:rPr lang="en" altLang="zh-TW" strike="sngStrike" dirty="0">
+                <a:hlinkClick r:id="rId2"/>
+              </a:rPr>
+              <a:t>your_email@example.com</a:t>
+            </a:r>
+            <a:endParaRPr lang="en" altLang="zh-TW" strike="sngStrike" dirty="0"/>
+          </a:p>
+          <a:p>
+            <a:r>
               <a:rPr lang="en" altLang="zh-TW" dirty="0"/>
-              <a:t>ssh-keygen -t </a:t>
-            </a:r>
-            <a:r>
-              <a:rPr lang="en" altLang="zh-TW" dirty="0" err="1"/>
-              <a:t>rsa</a:t>
-            </a:r>
-            <a:r>
-              <a:rPr lang="en" altLang="zh-TW" dirty="0"/>
-              <a:t> -b 4096 -C "</a:t>
-            </a:r>
-            <a:r>
-              <a:rPr lang="en" altLang="zh-TW" dirty="0" err="1"/>
-              <a:t>your_email@example.com</a:t>
+              <a:t>ssh-keygen -t ed25519 -C "</a:t>
+            </a:r>
+            <a:r>
+              <a:rPr lang="en" altLang="zh-TW" dirty="0">
+                <a:hlinkClick r:id="rId2"/>
+              </a:rPr>
+              <a:t>your_email@example.com </a:t>
             </a:r>
             <a:r>
               <a:rPr lang="en" altLang="zh-TW" dirty="0"/>
@@ -5386,23 +5401,7 @@
           <a:p>
             <a:r>
               <a:rPr lang="en" altLang="zh-TW" dirty="0"/>
-              <a:t>cd .ssh</a:t>
-            </a:r>
-          </a:p>
-          <a:p>
-            <a:r>
-              <a:rPr lang="en" altLang="zh-TW" dirty="0"/>
-              <a:t>Ls</a:t>
-            </a:r>
-          </a:p>
-          <a:p>
-            <a:r>
-              <a:rPr lang="en" altLang="zh-TW" dirty="0"/>
-              <a:t>cat </a:t>
-            </a:r>
-            <a:r>
-              <a:rPr lang="en" altLang="zh-TW" dirty="0" err="1"/>
-              <a:t>id_rsa.pub</a:t>
+              <a:t>cat ~/.ssh/id_ed25519.pub</a:t>
             </a:r>
             <a:br>
               <a:rPr lang="en" altLang="zh-TW" dirty="0"/>
@@ -5461,7 +5460,7 @@
           <p:nvPr/>
         </p:nvPicPr>
         <p:blipFill>
-          <a:blip r:embed="rId2">
+          <a:blip r:embed="rId3">
             <a:extLst>
               <a:ext uri="{28A0092B-C50C-407E-A947-70E740481C1C}">
                 <a14:useLocalDpi xmlns:a14="http://schemas.microsoft.com/office/drawing/2010/main" val="0"/>
@@ -5474,7 +5473,7 @@
         </p:blipFill>
         <p:spPr>
           <a:xfrm>
-            <a:off x="6551525" y="2321238"/>
+            <a:off x="6551525" y="2713124"/>
             <a:ext cx="5640475" cy="3551975"/>
           </a:xfrm>
           <a:prstGeom prst="rect">

</xml_diff>

<commit_message>
docs: refresh Git command notes in presentation
- Update the Git command note presentation file.
</commit_message>
<xml_diff>
--- a/Git/Git command note.pptx
+++ b/Git/Git command note.pptx
@@ -4,6 +4,9 @@
   <p:sldMasterIdLst>
     <p:sldMasterId id="2147483648" r:id="rId1"/>
   </p:sldMasterIdLst>
+  <p:notesMasterIdLst>
+    <p:notesMasterId r:id="rId13"/>
+  </p:notesMasterIdLst>
   <p:sldIdLst>
     <p:sldId id="256" r:id="rId2"/>
     <p:sldId id="261" r:id="rId3"/>
@@ -122,6 +125,451 @@
 </p:presentation>
 </file>
 
+<file path=ppt/notesMasters/notesMaster1.xml><?xml version="1.0" encoding="utf-8"?>
+<p:notesMaster xmlns:a="http://schemas.openxmlformats.org/drawingml/2006/main" xmlns:r="http://schemas.openxmlformats.org/officeDocument/2006/relationships" xmlns:p="http://schemas.openxmlformats.org/presentationml/2006/main">
+  <p:cSld>
+    <p:bg>
+      <p:bgRef idx="1001">
+        <a:schemeClr val="bg1"/>
+      </p:bgRef>
+    </p:bg>
+    <p:spTree>
+      <p:nvGrpSpPr>
+        <p:cNvPr id="1" name=""/>
+        <p:cNvGrpSpPr/>
+        <p:nvPr/>
+      </p:nvGrpSpPr>
+      <p:grpSpPr>
+        <a:xfrm>
+          <a:off x="0" y="0"/>
+          <a:ext cx="0" cy="0"/>
+          <a:chOff x="0" y="0"/>
+          <a:chExt cx="0" cy="0"/>
+        </a:xfrm>
+      </p:grpSpPr>
+      <p:sp>
+        <p:nvSpPr>
+          <p:cNvPr id="2" name="頁首版面配置區 1"/>
+          <p:cNvSpPr>
+            <a:spLocks noGrp="1"/>
+          </p:cNvSpPr>
+          <p:nvPr>
+            <p:ph type="hdr" sz="quarter"/>
+          </p:nvPr>
+        </p:nvSpPr>
+        <p:spPr>
+          <a:xfrm>
+            <a:off x="0" y="0"/>
+            <a:ext cx="2971800" cy="458788"/>
+          </a:xfrm>
+          <a:prstGeom prst="rect">
+            <a:avLst/>
+          </a:prstGeom>
+        </p:spPr>
+        <p:txBody>
+          <a:bodyPr vert="horz" lIns="91440" tIns="45720" rIns="91440" bIns="45720" rtlCol="0"/>
+          <a:lstStyle>
+            <a:lvl1pPr algn="l">
+              <a:defRPr sz="1200"/>
+            </a:lvl1pPr>
+          </a:lstStyle>
+          <a:p>
+            <a:endParaRPr kumimoji="1" lang="zh-TW" altLang="en-US"/>
+          </a:p>
+        </p:txBody>
+      </p:sp>
+      <p:sp>
+        <p:nvSpPr>
+          <p:cNvPr id="3" name="日期版面配置區 2"/>
+          <p:cNvSpPr>
+            <a:spLocks noGrp="1"/>
+          </p:cNvSpPr>
+          <p:nvPr>
+            <p:ph type="dt" idx="1"/>
+          </p:nvPr>
+        </p:nvSpPr>
+        <p:spPr>
+          <a:xfrm>
+            <a:off x="3884613" y="0"/>
+            <a:ext cx="2971800" cy="458788"/>
+          </a:xfrm>
+          <a:prstGeom prst="rect">
+            <a:avLst/>
+          </a:prstGeom>
+        </p:spPr>
+        <p:txBody>
+          <a:bodyPr vert="horz" lIns="91440" tIns="45720" rIns="91440" bIns="45720" rtlCol="0"/>
+          <a:lstStyle>
+            <a:lvl1pPr algn="r">
+              <a:defRPr sz="1200"/>
+            </a:lvl1pPr>
+          </a:lstStyle>
+          <a:p>
+            <a:fld id="{8D320AAA-A87D-E648-A9AB-ABF695582CC7}" type="datetimeFigureOut">
+              <a:rPr kumimoji="1" lang="zh-TW" altLang="en-US" smtClean="0"/>
+              <a:t>2025/8/17</a:t>
+            </a:fld>
+            <a:endParaRPr kumimoji="1" lang="zh-TW" altLang="en-US"/>
+          </a:p>
+        </p:txBody>
+      </p:sp>
+      <p:sp>
+        <p:nvSpPr>
+          <p:cNvPr id="4" name="投影片影像版面配置區 3"/>
+          <p:cNvSpPr>
+            <a:spLocks noGrp="1" noRot="1" noChangeAspect="1"/>
+          </p:cNvSpPr>
+          <p:nvPr>
+            <p:ph type="sldImg" idx="2"/>
+          </p:nvPr>
+        </p:nvSpPr>
+        <p:spPr>
+          <a:xfrm>
+            <a:off x="685800" y="1143000"/>
+            <a:ext cx="5486400" cy="3086100"/>
+          </a:xfrm>
+          <a:prstGeom prst="rect">
+            <a:avLst/>
+          </a:prstGeom>
+          <a:noFill/>
+          <a:ln w="12700">
+            <a:solidFill>
+              <a:prstClr val="black"/>
+            </a:solidFill>
+          </a:ln>
+        </p:spPr>
+        <p:txBody>
+          <a:bodyPr vert="horz" lIns="91440" tIns="45720" rIns="91440" bIns="45720" rtlCol="0" anchor="ctr"/>
+          <a:lstStyle/>
+          <a:p>
+            <a:endParaRPr lang="zh-TW" altLang="en-US"/>
+          </a:p>
+        </p:txBody>
+      </p:sp>
+      <p:sp>
+        <p:nvSpPr>
+          <p:cNvPr id="5" name="備忘稿版面配置區 4"/>
+          <p:cNvSpPr>
+            <a:spLocks noGrp="1"/>
+          </p:cNvSpPr>
+          <p:nvPr>
+            <p:ph type="body" sz="quarter" idx="3"/>
+          </p:nvPr>
+        </p:nvSpPr>
+        <p:spPr>
+          <a:xfrm>
+            <a:off x="685800" y="4400550"/>
+            <a:ext cx="5486400" cy="3600450"/>
+          </a:xfrm>
+          <a:prstGeom prst="rect">
+            <a:avLst/>
+          </a:prstGeom>
+        </p:spPr>
+        <p:txBody>
+          <a:bodyPr vert="horz" lIns="91440" tIns="45720" rIns="91440" bIns="45720" rtlCol="0"/>
+          <a:lstStyle/>
+          <a:p>
+            <a:pPr lvl="0"/>
+            <a:r>
+              <a:rPr kumimoji="1" lang="zh-TW" altLang="en-US"/>
+              <a:t>按一下以編輯母片文字樣式</a:t>
+            </a:r>
+          </a:p>
+          <a:p>
+            <a:pPr lvl="1"/>
+            <a:r>
+              <a:rPr kumimoji="1" lang="zh-TW" altLang="en-US"/>
+              <a:t>第二層</a:t>
+            </a:r>
+          </a:p>
+          <a:p>
+            <a:pPr lvl="2"/>
+            <a:r>
+              <a:rPr kumimoji="1" lang="zh-TW" altLang="en-US"/>
+              <a:t>第三層</a:t>
+            </a:r>
+          </a:p>
+          <a:p>
+            <a:pPr lvl="3"/>
+            <a:r>
+              <a:rPr kumimoji="1" lang="zh-TW" altLang="en-US"/>
+              <a:t>第四層</a:t>
+            </a:r>
+          </a:p>
+          <a:p>
+            <a:pPr lvl="4"/>
+            <a:r>
+              <a:rPr kumimoji="1" lang="zh-TW" altLang="en-US"/>
+              <a:t>第五層</a:t>
+            </a:r>
+          </a:p>
+        </p:txBody>
+      </p:sp>
+      <p:sp>
+        <p:nvSpPr>
+          <p:cNvPr id="6" name="頁尾版面配置區 5"/>
+          <p:cNvSpPr>
+            <a:spLocks noGrp="1"/>
+          </p:cNvSpPr>
+          <p:nvPr>
+            <p:ph type="ftr" sz="quarter" idx="4"/>
+          </p:nvPr>
+        </p:nvSpPr>
+        <p:spPr>
+          <a:xfrm>
+            <a:off x="0" y="8685213"/>
+            <a:ext cx="2971800" cy="458787"/>
+          </a:xfrm>
+          <a:prstGeom prst="rect">
+            <a:avLst/>
+          </a:prstGeom>
+        </p:spPr>
+        <p:txBody>
+          <a:bodyPr vert="horz" lIns="91440" tIns="45720" rIns="91440" bIns="45720" rtlCol="0" anchor="b"/>
+          <a:lstStyle>
+            <a:lvl1pPr algn="l">
+              <a:defRPr sz="1200"/>
+            </a:lvl1pPr>
+          </a:lstStyle>
+          <a:p>
+            <a:endParaRPr kumimoji="1" lang="zh-TW" altLang="en-US"/>
+          </a:p>
+        </p:txBody>
+      </p:sp>
+      <p:sp>
+        <p:nvSpPr>
+          <p:cNvPr id="7" name="投影片編號版面配置區 6"/>
+          <p:cNvSpPr>
+            <a:spLocks noGrp="1"/>
+          </p:cNvSpPr>
+          <p:nvPr>
+            <p:ph type="sldNum" sz="quarter" idx="5"/>
+          </p:nvPr>
+        </p:nvSpPr>
+        <p:spPr>
+          <a:xfrm>
+            <a:off x="3884613" y="8685213"/>
+            <a:ext cx="2971800" cy="458787"/>
+          </a:xfrm>
+          <a:prstGeom prst="rect">
+            <a:avLst/>
+          </a:prstGeom>
+        </p:spPr>
+        <p:txBody>
+          <a:bodyPr vert="horz" lIns="91440" tIns="45720" rIns="91440" bIns="45720" rtlCol="0" anchor="b"/>
+          <a:lstStyle>
+            <a:lvl1pPr algn="r">
+              <a:defRPr sz="1200"/>
+            </a:lvl1pPr>
+          </a:lstStyle>
+          <a:p>
+            <a:fld id="{8132EC45-62F6-D04A-8D2B-D70BDFFA5235}" type="slidenum">
+              <a:rPr kumimoji="1" lang="zh-TW" altLang="en-US" smtClean="0"/>
+              <a:t>‹#›</a:t>
+            </a:fld>
+            <a:endParaRPr kumimoji="1" lang="zh-TW" altLang="en-US"/>
+          </a:p>
+        </p:txBody>
+      </p:sp>
+    </p:spTree>
+    <p:extLst>
+      <p:ext uri="{BB962C8B-B14F-4D97-AF65-F5344CB8AC3E}">
+        <p14:creationId xmlns:p14="http://schemas.microsoft.com/office/powerpoint/2010/main" val="61395268"/>
+      </p:ext>
+    </p:extLst>
+  </p:cSld>
+  <p:clrMap bg1="lt1" tx1="dk1" bg2="lt2" tx2="dk2" accent1="accent1" accent2="accent2" accent3="accent3" accent4="accent4" accent5="accent5" accent6="accent6" hlink="hlink" folHlink="folHlink"/>
+  <p:notesStyle>
+    <a:lvl1pPr marL="0" algn="l" defTabSz="914400" rtl="0" eaLnBrk="1" latinLnBrk="0" hangingPunct="1">
+      <a:defRPr sz="1200" kern="1200">
+        <a:solidFill>
+          <a:schemeClr val="tx1"/>
+        </a:solidFill>
+        <a:latin typeface="+mn-lt"/>
+        <a:ea typeface="+mn-ea"/>
+        <a:cs typeface="+mn-cs"/>
+      </a:defRPr>
+    </a:lvl1pPr>
+    <a:lvl2pPr marL="457200" algn="l" defTabSz="914400" rtl="0" eaLnBrk="1" latinLnBrk="0" hangingPunct="1">
+      <a:defRPr sz="1200" kern="1200">
+        <a:solidFill>
+          <a:schemeClr val="tx1"/>
+        </a:solidFill>
+        <a:latin typeface="+mn-lt"/>
+        <a:ea typeface="+mn-ea"/>
+        <a:cs typeface="+mn-cs"/>
+      </a:defRPr>
+    </a:lvl2pPr>
+    <a:lvl3pPr marL="914400" algn="l" defTabSz="914400" rtl="0" eaLnBrk="1" latinLnBrk="0" hangingPunct="1">
+      <a:defRPr sz="1200" kern="1200">
+        <a:solidFill>
+          <a:schemeClr val="tx1"/>
+        </a:solidFill>
+        <a:latin typeface="+mn-lt"/>
+        <a:ea typeface="+mn-ea"/>
+        <a:cs typeface="+mn-cs"/>
+      </a:defRPr>
+    </a:lvl3pPr>
+    <a:lvl4pPr marL="1371600" algn="l" defTabSz="914400" rtl="0" eaLnBrk="1" latinLnBrk="0" hangingPunct="1">
+      <a:defRPr sz="1200" kern="1200">
+        <a:solidFill>
+          <a:schemeClr val="tx1"/>
+        </a:solidFill>
+        <a:latin typeface="+mn-lt"/>
+        <a:ea typeface="+mn-ea"/>
+        <a:cs typeface="+mn-cs"/>
+      </a:defRPr>
+    </a:lvl4pPr>
+    <a:lvl5pPr marL="1828800" algn="l" defTabSz="914400" rtl="0" eaLnBrk="1" latinLnBrk="0" hangingPunct="1">
+      <a:defRPr sz="1200" kern="1200">
+        <a:solidFill>
+          <a:schemeClr val="tx1"/>
+        </a:solidFill>
+        <a:latin typeface="+mn-lt"/>
+        <a:ea typeface="+mn-ea"/>
+        <a:cs typeface="+mn-cs"/>
+      </a:defRPr>
+    </a:lvl5pPr>
+    <a:lvl6pPr marL="2286000" algn="l" defTabSz="914400" rtl="0" eaLnBrk="1" latinLnBrk="0" hangingPunct="1">
+      <a:defRPr sz="1200" kern="1200">
+        <a:solidFill>
+          <a:schemeClr val="tx1"/>
+        </a:solidFill>
+        <a:latin typeface="+mn-lt"/>
+        <a:ea typeface="+mn-ea"/>
+        <a:cs typeface="+mn-cs"/>
+      </a:defRPr>
+    </a:lvl6pPr>
+    <a:lvl7pPr marL="2743200" algn="l" defTabSz="914400" rtl="0" eaLnBrk="1" latinLnBrk="0" hangingPunct="1">
+      <a:defRPr sz="1200" kern="1200">
+        <a:solidFill>
+          <a:schemeClr val="tx1"/>
+        </a:solidFill>
+        <a:latin typeface="+mn-lt"/>
+        <a:ea typeface="+mn-ea"/>
+        <a:cs typeface="+mn-cs"/>
+      </a:defRPr>
+    </a:lvl7pPr>
+    <a:lvl8pPr marL="3200400" algn="l" defTabSz="914400" rtl="0" eaLnBrk="1" latinLnBrk="0" hangingPunct="1">
+      <a:defRPr sz="1200" kern="1200">
+        <a:solidFill>
+          <a:schemeClr val="tx1"/>
+        </a:solidFill>
+        <a:latin typeface="+mn-lt"/>
+        <a:ea typeface="+mn-ea"/>
+        <a:cs typeface="+mn-cs"/>
+      </a:defRPr>
+    </a:lvl8pPr>
+    <a:lvl9pPr marL="3657600" algn="l" defTabSz="914400" rtl="0" eaLnBrk="1" latinLnBrk="0" hangingPunct="1">
+      <a:defRPr sz="1200" kern="1200">
+        <a:solidFill>
+          <a:schemeClr val="tx1"/>
+        </a:solidFill>
+        <a:latin typeface="+mn-lt"/>
+        <a:ea typeface="+mn-ea"/>
+        <a:cs typeface="+mn-cs"/>
+      </a:defRPr>
+    </a:lvl9pPr>
+  </p:notesStyle>
+</p:notesMaster>
+</file>
+
+<file path=ppt/notesSlides/notesSlide1.xml><?xml version="1.0" encoding="utf-8"?>
+<p:notes xmlns:a="http://schemas.openxmlformats.org/drawingml/2006/main" xmlns:r="http://schemas.openxmlformats.org/officeDocument/2006/relationships" xmlns:p="http://schemas.openxmlformats.org/presentationml/2006/main">
+  <p:cSld>
+    <p:spTree>
+      <p:nvGrpSpPr>
+        <p:cNvPr id="1" name=""/>
+        <p:cNvGrpSpPr/>
+        <p:nvPr/>
+      </p:nvGrpSpPr>
+      <p:grpSpPr>
+        <a:xfrm>
+          <a:off x="0" y="0"/>
+          <a:ext cx="0" cy="0"/>
+          <a:chOff x="0" y="0"/>
+          <a:chExt cx="0" cy="0"/>
+        </a:xfrm>
+      </p:grpSpPr>
+      <p:sp>
+        <p:nvSpPr>
+          <p:cNvPr id="2" name="投影片影像版面配置區 1"/>
+          <p:cNvSpPr>
+            <a:spLocks noGrp="1" noRot="1" noChangeAspect="1"/>
+          </p:cNvSpPr>
+          <p:nvPr>
+            <p:ph type="sldImg"/>
+          </p:nvPr>
+        </p:nvSpPr>
+        <p:spPr/>
+      </p:sp>
+      <p:sp>
+        <p:nvSpPr>
+          <p:cNvPr id="3" name="備忘稿版面配置區 2"/>
+          <p:cNvSpPr>
+            <a:spLocks noGrp="1"/>
+          </p:cNvSpPr>
+          <p:nvPr>
+            <p:ph type="body" idx="1"/>
+          </p:nvPr>
+        </p:nvSpPr>
+        <p:spPr/>
+        <p:txBody>
+          <a:bodyPr/>
+          <a:lstStyle/>
+          <a:p>
+            <a:r>
+              <a:rPr kumimoji="1" lang="en" altLang="zh-TW" dirty="0"/>
+              <a:t>https://</a:t>
+            </a:r>
+            <a:r>
+              <a:rPr kumimoji="1" lang="en" altLang="zh-TW" dirty="0" err="1"/>
+              <a:t>miahsuwork.medium.com</a:t>
+            </a:r>
+            <a:r>
+              <a:rPr kumimoji="1" lang="en" altLang="zh-TW" dirty="0"/>
+              <a:t>/%E7%AC%AC%E4%BA%8C%E9%80%B1-git-%E9%80%B2%E9%9A%8E%E4%BD%BF%E7%94%A8-branch-merge-a571cc0a95de</a:t>
+            </a:r>
+            <a:endParaRPr kumimoji="1" lang="zh-TW" altLang="en-US" dirty="0"/>
+          </a:p>
+        </p:txBody>
+      </p:sp>
+      <p:sp>
+        <p:nvSpPr>
+          <p:cNvPr id="4" name="投影片編號版面配置區 3"/>
+          <p:cNvSpPr>
+            <a:spLocks noGrp="1"/>
+          </p:cNvSpPr>
+          <p:nvPr>
+            <p:ph type="sldNum" sz="quarter" idx="5"/>
+          </p:nvPr>
+        </p:nvSpPr>
+        <p:spPr/>
+        <p:txBody>
+          <a:bodyPr/>
+          <a:lstStyle/>
+          <a:p>
+            <a:fld id="{8132EC45-62F6-D04A-8D2B-D70BDFFA5235}" type="slidenum">
+              <a:rPr kumimoji="1" lang="zh-TW" altLang="en-US" smtClean="0"/>
+              <a:t>11</a:t>
+            </a:fld>
+            <a:endParaRPr kumimoji="1" lang="zh-TW" altLang="en-US"/>
+          </a:p>
+        </p:txBody>
+      </p:sp>
+    </p:spTree>
+    <p:extLst>
+      <p:ext uri="{BB962C8B-B14F-4D97-AF65-F5344CB8AC3E}">
+        <p14:creationId xmlns:p14="http://schemas.microsoft.com/office/powerpoint/2010/main" val="2823074961"/>
+      </p:ext>
+    </p:extLst>
+  </p:cSld>
+  <p:clrMapOvr>
+    <a:masterClrMapping/>
+  </p:clrMapOvr>
+</p:notes>
+</file>
+
 <file path=ppt/slideLayouts/slideLayout1.xml><?xml version="1.0" encoding="utf-8"?>
 <p:sldLayout xmlns:a="http://schemas.openxmlformats.org/drawingml/2006/main" xmlns:r="http://schemas.openxmlformats.org/officeDocument/2006/relationships" xmlns:p="http://schemas.openxmlformats.org/presentationml/2006/main" type="title" preserve="1">
   <p:cSld name="標題投影片">
@@ -269,7 +717,7 @@
           <a:p>
             <a:fld id="{925C6706-211F-4BEB-A3E9-6EC3BDFFB106}" type="datetimeFigureOut">
               <a:rPr lang="zh-TW" altLang="en-US" smtClean="0"/>
-              <a:t>2025/8/15</a:t>
+              <a:t>2025/8/16</a:t>
             </a:fld>
             <a:endParaRPr lang="zh-TW" altLang="en-US"/>
           </a:p>
@@ -467,7 +915,7 @@
           <a:p>
             <a:fld id="{925C6706-211F-4BEB-A3E9-6EC3BDFFB106}" type="datetimeFigureOut">
               <a:rPr lang="zh-TW" altLang="en-US" smtClean="0"/>
-              <a:t>2025/8/15</a:t>
+              <a:t>2025/8/16</a:t>
             </a:fld>
             <a:endParaRPr lang="zh-TW" altLang="en-US"/>
           </a:p>
@@ -675,7 +1123,7 @@
           <a:p>
             <a:fld id="{925C6706-211F-4BEB-A3E9-6EC3BDFFB106}" type="datetimeFigureOut">
               <a:rPr lang="zh-TW" altLang="en-US" smtClean="0"/>
-              <a:t>2025/8/15</a:t>
+              <a:t>2025/8/16</a:t>
             </a:fld>
             <a:endParaRPr lang="zh-TW" altLang="en-US"/>
           </a:p>
@@ -873,7 +1321,7 @@
           <a:p>
             <a:fld id="{925C6706-211F-4BEB-A3E9-6EC3BDFFB106}" type="datetimeFigureOut">
               <a:rPr lang="zh-TW" altLang="en-US" smtClean="0"/>
-              <a:t>2025/8/15</a:t>
+              <a:t>2025/8/16</a:t>
             </a:fld>
             <a:endParaRPr lang="zh-TW" altLang="en-US"/>
           </a:p>
@@ -1148,7 +1596,7 @@
           <a:p>
             <a:fld id="{925C6706-211F-4BEB-A3E9-6EC3BDFFB106}" type="datetimeFigureOut">
               <a:rPr lang="zh-TW" altLang="en-US" smtClean="0"/>
-              <a:t>2025/8/15</a:t>
+              <a:t>2025/8/16</a:t>
             </a:fld>
             <a:endParaRPr lang="zh-TW" altLang="en-US"/>
           </a:p>
@@ -1413,7 +1861,7 @@
           <a:p>
             <a:fld id="{925C6706-211F-4BEB-A3E9-6EC3BDFFB106}" type="datetimeFigureOut">
               <a:rPr lang="zh-TW" altLang="en-US" smtClean="0"/>
-              <a:t>2025/8/15</a:t>
+              <a:t>2025/8/16</a:t>
             </a:fld>
             <a:endParaRPr lang="zh-TW" altLang="en-US"/>
           </a:p>
@@ -1825,7 +2273,7 @@
           <a:p>
             <a:fld id="{925C6706-211F-4BEB-A3E9-6EC3BDFFB106}" type="datetimeFigureOut">
               <a:rPr lang="zh-TW" altLang="en-US" smtClean="0"/>
-              <a:t>2025/8/15</a:t>
+              <a:t>2025/8/16</a:t>
             </a:fld>
             <a:endParaRPr lang="zh-TW" altLang="en-US"/>
           </a:p>
@@ -1966,7 +2414,7 @@
           <a:p>
             <a:fld id="{925C6706-211F-4BEB-A3E9-6EC3BDFFB106}" type="datetimeFigureOut">
               <a:rPr lang="zh-TW" altLang="en-US" smtClean="0"/>
-              <a:t>2025/8/15</a:t>
+              <a:t>2025/8/16</a:t>
             </a:fld>
             <a:endParaRPr lang="zh-TW" altLang="en-US"/>
           </a:p>
@@ -2079,7 +2527,7 @@
           <a:p>
             <a:fld id="{925C6706-211F-4BEB-A3E9-6EC3BDFFB106}" type="datetimeFigureOut">
               <a:rPr lang="zh-TW" altLang="en-US" smtClean="0"/>
-              <a:t>2025/8/15</a:t>
+              <a:t>2025/8/16</a:t>
             </a:fld>
             <a:endParaRPr lang="zh-TW" altLang="en-US"/>
           </a:p>
@@ -2390,7 +2838,7 @@
           <a:p>
             <a:fld id="{925C6706-211F-4BEB-A3E9-6EC3BDFFB106}" type="datetimeFigureOut">
               <a:rPr lang="zh-TW" altLang="en-US" smtClean="0"/>
-              <a:t>2025/8/15</a:t>
+              <a:t>2025/8/16</a:t>
             </a:fld>
             <a:endParaRPr lang="zh-TW" altLang="en-US"/>
           </a:p>
@@ -2678,7 +3126,7 @@
           <a:p>
             <a:fld id="{925C6706-211F-4BEB-A3E9-6EC3BDFFB106}" type="datetimeFigureOut">
               <a:rPr lang="zh-TW" altLang="en-US" smtClean="0"/>
-              <a:t>2025/8/15</a:t>
+              <a:t>2025/8/16</a:t>
             </a:fld>
             <a:endParaRPr lang="zh-TW" altLang="en-US"/>
           </a:p>
@@ -2919,7 +3367,7 @@
           <a:p>
             <a:fld id="{925C6706-211F-4BEB-A3E9-6EC3BDFFB106}" type="datetimeFigureOut">
               <a:rPr lang="zh-TW" altLang="en-US" smtClean="0"/>
-              <a:t>2025/8/15</a:t>
+              <a:t>2025/8/16</a:t>
             </a:fld>
             <a:endParaRPr lang="zh-TW" altLang="en-US"/>
           </a:p>
@@ -3639,7 +4087,155 @@
           <a:bodyPr/>
           <a:lstStyle/>
           <a:p>
-            <a:endParaRPr lang="zh-TW" altLang="en-US"/>
+            <a:r>
+              <a:rPr lang="en-US" altLang="zh-TW" b="1" dirty="0"/>
+              <a:t>Ex :</a:t>
+            </a:r>
+            <a:r>
+              <a:rPr lang="zh-TW" altLang="en-US" b="1" dirty="0"/>
+              <a:t>將 </a:t>
+            </a:r>
+            <a:r>
+              <a:rPr lang="en" altLang="zh-TW" b="1" dirty="0"/>
+              <a:t>one </a:t>
+            </a:r>
+            <a:r>
+              <a:rPr lang="zh-TW" altLang="en-US" b="1" dirty="0"/>
+              <a:t>合併到 </a:t>
+            </a:r>
+            <a:r>
+              <a:rPr lang="en-US" altLang="zh-TW" b="1" dirty="0"/>
+              <a:t>Main</a:t>
+            </a:r>
+            <a:endParaRPr lang="en" altLang="zh-TW" b="1" dirty="0"/>
+          </a:p>
+          <a:p>
+            <a:r>
+              <a:rPr lang="en" altLang="zh-TW" b="1" dirty="0"/>
+              <a:t>step1. </a:t>
+            </a:r>
+            <a:r>
+              <a:rPr lang="zh-TW" altLang="en-US" b="1" dirty="0"/>
+              <a:t>切換到 </a:t>
+            </a:r>
+            <a:r>
+              <a:rPr lang="en-US" altLang="zh-TW" b="1" dirty="0"/>
+              <a:t>Main</a:t>
+            </a:r>
+            <a:r>
+              <a:rPr lang="zh-TW" altLang="en-US" b="1" dirty="0"/>
+              <a:t>這個分支</a:t>
+            </a:r>
+            <a:endParaRPr lang="zh-TW" altLang="en-US" dirty="0"/>
+          </a:p>
+          <a:p>
+            <a:r>
+              <a:rPr lang="en-US" altLang="zh-TW" dirty="0"/>
+              <a:t>$ </a:t>
+            </a:r>
+            <a:r>
+              <a:rPr lang="en" altLang="zh-TW" dirty="0"/>
+              <a:t>git checkout main</a:t>
+            </a:r>
+          </a:p>
+          <a:p>
+            <a:r>
+              <a:rPr lang="en" altLang="zh-TW" b="1" dirty="0"/>
+              <a:t>step2. </a:t>
+            </a:r>
+            <a:r>
+              <a:rPr lang="zh-TW" altLang="en-US" b="1" dirty="0"/>
+              <a:t>合併 </a:t>
+            </a:r>
+            <a:r>
+              <a:rPr lang="en" altLang="zh-TW" b="1" dirty="0"/>
+              <a:t>one</a:t>
+            </a:r>
+            <a:endParaRPr lang="en" altLang="zh-TW" dirty="0"/>
+          </a:p>
+          <a:p>
+            <a:r>
+              <a:rPr lang="en" altLang="zh-TW" dirty="0"/>
+              <a:t>$ git merge one</a:t>
+            </a:r>
+          </a:p>
+          <a:p>
+            <a:endParaRPr lang="zh-TW" altLang="en-US" dirty="0"/>
+          </a:p>
+        </p:txBody>
+      </p:sp>
+      <p:sp>
+        <p:nvSpPr>
+          <p:cNvPr id="4" name="文字方塊 3">
+            <a:extLst>
+              <a:ext uri="{FF2B5EF4-FFF2-40B4-BE49-F238E27FC236}">
+                <a16:creationId xmlns:a16="http://schemas.microsoft.com/office/drawing/2014/main" id="{D9B4BA52-C16A-EF44-B839-A2998B02C62A}"/>
+              </a:ext>
+            </a:extLst>
+          </p:cNvPr>
+          <p:cNvSpPr txBox="1"/>
+          <p:nvPr/>
+        </p:nvSpPr>
+        <p:spPr>
+          <a:xfrm>
+            <a:off x="7049386" y="1825624"/>
+            <a:ext cx="4869711" cy="646331"/>
+          </a:xfrm>
+          <a:prstGeom prst="rect">
+            <a:avLst/>
+          </a:prstGeom>
+          <a:noFill/>
+        </p:spPr>
+        <p:txBody>
+          <a:bodyPr wrap="square" rtlCol="0">
+            <a:spAutoFit/>
+          </a:bodyPr>
+          <a:lstStyle/>
+          <a:p>
+            <a:r>
+              <a:rPr kumimoji="1" lang="en-US" altLang="zh-TW" dirty="0"/>
+              <a:t>Tip</a:t>
+            </a:r>
+            <a:r>
+              <a:rPr kumimoji="1" lang="zh-TW" altLang="en-US" dirty="0"/>
+              <a:t>：</a:t>
+            </a:r>
+            <a:endParaRPr kumimoji="1" lang="en-US" altLang="zh-TW" dirty="0"/>
+          </a:p>
+          <a:p>
+            <a:r>
+              <a:rPr kumimoji="1" lang="zh-TW" altLang="en-US" dirty="0"/>
+              <a:t>切換到要</a:t>
+            </a:r>
+            <a:r>
+              <a:rPr kumimoji="1" lang="zh-TW" altLang="en-US" dirty="0">
+                <a:solidFill>
+                  <a:srgbClr val="FF0000"/>
+                </a:solidFill>
+              </a:rPr>
+              <a:t>合併</a:t>
+            </a:r>
+            <a:r>
+              <a:rPr kumimoji="1" lang="zh-TW" altLang="en-US" dirty="0"/>
+              <a:t>那條分支，</a:t>
+            </a:r>
+            <a:r>
+              <a:rPr kumimoji="1" lang="en-US" altLang="zh-TW" dirty="0"/>
+              <a:t>merge</a:t>
+            </a:r>
+            <a:r>
+              <a:rPr kumimoji="1" lang="zh-TW" altLang="en-US" dirty="0">
+                <a:solidFill>
+                  <a:srgbClr val="FF0000"/>
+                </a:solidFill>
+              </a:rPr>
+              <a:t>被合併</a:t>
+            </a:r>
+            <a:r>
+              <a:rPr kumimoji="1" lang="zh-TW" altLang="en-US" dirty="0"/>
+              <a:t>分支</a:t>
+            </a:r>
+            <a:endParaRPr kumimoji="1" lang="en-US" altLang="zh-TW" dirty="0"/>
           </a:p>
         </p:txBody>
       </p:sp>
@@ -4311,6 +4907,41 @@
                 <a:srgbClr val="FF0000"/>
               </a:solidFill>
             </a:endParaRPr>
+          </a:p>
+        </p:txBody>
+      </p:sp>
+      <p:sp>
+        <p:nvSpPr>
+          <p:cNvPr id="4" name="文字方塊 3">
+            <a:extLst>
+              <a:ext uri="{FF2B5EF4-FFF2-40B4-BE49-F238E27FC236}">
+                <a16:creationId xmlns:a16="http://schemas.microsoft.com/office/drawing/2014/main" id="{DF99C8CC-8234-576D-729F-D4F7EB28A827}"/>
+              </a:ext>
+            </a:extLst>
+          </p:cNvPr>
+          <p:cNvSpPr txBox="1"/>
+          <p:nvPr/>
+        </p:nvSpPr>
+        <p:spPr>
+          <a:xfrm>
+            <a:off x="5611332" y="6488668"/>
+            <a:ext cx="6097772" cy="369332"/>
+          </a:xfrm>
+          <a:prstGeom prst="rect">
+            <a:avLst/>
+          </a:prstGeom>
+          <a:noFill/>
+        </p:spPr>
+        <p:txBody>
+          <a:bodyPr wrap="square">
+            <a:spAutoFit/>
+          </a:bodyPr>
+          <a:lstStyle/>
+          <a:p>
+            <a:r>
+              <a:rPr lang="zh-TW" altLang="en-US" dirty="0"/>
+              <a:t>https://ithelp.ithome.com.tw/articles/10281080</a:t>
+            </a:r>
           </a:p>
         </p:txBody>
       </p:sp>
@@ -4819,7 +5450,7 @@
         </p:blipFill>
         <p:spPr>
           <a:xfrm>
-            <a:off x="2307665" y="3018889"/>
+            <a:off x="1085151" y="1695208"/>
             <a:ext cx="5010849" cy="3467584"/>
           </a:xfrm>
           <a:prstGeom prst="rect">
@@ -4857,6 +5488,41 @@
           </a:prstGeom>
         </p:spPr>
       </p:pic>
+      <p:sp>
+        <p:nvSpPr>
+          <p:cNvPr id="5" name="文字方塊 4">
+            <a:extLst>
+              <a:ext uri="{FF2B5EF4-FFF2-40B4-BE49-F238E27FC236}">
+                <a16:creationId xmlns:a16="http://schemas.microsoft.com/office/drawing/2014/main" id="{07829F95-7FB8-8702-E25F-40E755545F92}"/>
+              </a:ext>
+            </a:extLst>
+          </p:cNvPr>
+          <p:cNvSpPr txBox="1"/>
+          <p:nvPr/>
+        </p:nvSpPr>
+        <p:spPr>
+          <a:xfrm>
+            <a:off x="975538" y="6061686"/>
+            <a:ext cx="6097772" cy="646331"/>
+          </a:xfrm>
+          <a:prstGeom prst="rect">
+            <a:avLst/>
+          </a:prstGeom>
+          <a:noFill/>
+        </p:spPr>
+        <p:txBody>
+          <a:bodyPr wrap="square">
+            <a:spAutoFit/>
+          </a:bodyPr>
+          <a:lstStyle/>
+          <a:p>
+            <a:r>
+              <a:rPr lang="zh-TW" altLang="en-US" dirty="0"/>
+              <a:t>https://wadehuanglearning.blogspot.com/2019/05/commit-commit-commit-why-what-commit.html</a:t>
+            </a:r>
+          </a:p>
+        </p:txBody>
+      </p:sp>
     </p:spTree>
     <p:extLst>
       <p:ext uri="{BB962C8B-B14F-4D97-AF65-F5344CB8AC3E}">
@@ -5473,7 +6139,7 @@
         </p:blipFill>
         <p:spPr>
           <a:xfrm>
-            <a:off x="6551525" y="2713124"/>
+            <a:off x="5924204" y="2415412"/>
             <a:ext cx="5640475" cy="3551975"/>
           </a:xfrm>
           <a:prstGeom prst="rect">
@@ -5615,6 +6281,36 @@
           </a:p>
         </p:txBody>
       </p:sp>
+      <p:pic>
+        <p:nvPicPr>
+          <p:cNvPr id="4" name="圖片 3">
+            <a:extLst>
+              <a:ext uri="{FF2B5EF4-FFF2-40B4-BE49-F238E27FC236}">
+                <a16:creationId xmlns:a16="http://schemas.microsoft.com/office/drawing/2014/main" id="{5843C4C9-BC3B-8829-6814-CB37E60332D7}"/>
+              </a:ext>
+            </a:extLst>
+          </p:cNvPr>
+          <p:cNvPicPr>
+            <a:picLocks noChangeAspect="1"/>
+          </p:cNvPicPr>
+          <p:nvPr/>
+        </p:nvPicPr>
+        <p:blipFill>
+          <a:blip r:embed="rId2"/>
+          <a:stretch>
+            <a:fillRect/>
+          </a:stretch>
+        </p:blipFill>
+        <p:spPr>
+          <a:xfrm>
+            <a:off x="948436" y="5142991"/>
+            <a:ext cx="4635500" cy="874623"/>
+          </a:xfrm>
+          <a:prstGeom prst="rect">
+            <a:avLst/>
+          </a:prstGeom>
+        </p:spPr>
+      </p:pic>
     </p:spTree>
     <p:extLst>
       <p:ext uri="{BB962C8B-B14F-4D97-AF65-F5344CB8AC3E}">
@@ -5921,4 +6617,319 @@
     </a:ext>
   </a:extLst>
 </a:theme>
+</file>
+
+<file path=ppt/theme/theme2.xml><?xml version="1.0" encoding="utf-8"?>
+<a:theme xmlns:a="http://schemas.openxmlformats.org/drawingml/2006/main" name="Office 佈景主題">
+  <a:themeElements>
+    <a:clrScheme name="Office">
+      <a:dk1>
+        <a:sysClr val="windowText" lastClr="000000"/>
+      </a:dk1>
+      <a:lt1>
+        <a:sysClr val="window" lastClr="FFFFFF"/>
+      </a:lt1>
+      <a:dk2>
+        <a:srgbClr val="0E2841"/>
+      </a:dk2>
+      <a:lt2>
+        <a:srgbClr val="E8E8E8"/>
+      </a:lt2>
+      <a:accent1>
+        <a:srgbClr val="156082"/>
+      </a:accent1>
+      <a:accent2>
+        <a:srgbClr val="E97132"/>
+      </a:accent2>
+      <a:accent3>
+        <a:srgbClr val="196B24"/>
+      </a:accent3>
+      <a:accent4>
+        <a:srgbClr val="0F9ED5"/>
+      </a:accent4>
+      <a:accent5>
+        <a:srgbClr val="A02B93"/>
+      </a:accent5>
+      <a:accent6>
+        <a:srgbClr val="4EA72E"/>
+      </a:accent6>
+      <a:hlink>
+        <a:srgbClr val="467886"/>
+      </a:hlink>
+      <a:folHlink>
+        <a:srgbClr val="96607D"/>
+      </a:folHlink>
+    </a:clrScheme>
+    <a:fontScheme name="Office">
+      <a:majorFont>
+        <a:latin typeface="Aptos Display" panose="02110004020202020204"/>
+        <a:ea typeface=""/>
+        <a:cs typeface=""/>
+        <a:font script="Jpan" typeface="游ゴシック Light"/>
+        <a:font script="Hang" typeface="맑은 고딕"/>
+        <a:font script="Hans" typeface="等线 Light"/>
+        <a:font script="Hant" typeface="新細明體"/>
+        <a:font script="Arab" typeface="Times New Roman"/>
+        <a:font script="Hebr" typeface="Times New Roman"/>
+        <a:font script="Thai" typeface="Angsana New"/>
+        <a:font script="Ethi" typeface="Nyala"/>
+        <a:font script="Beng" typeface="Vrinda"/>
+        <a:font script="Gujr" typeface="Shruti"/>
+        <a:font script="Khmr" typeface="MoolBoran"/>
+        <a:font script="Knda" typeface="Tunga"/>
+        <a:font script="Guru" typeface="Raavi"/>
+        <a:font script="Cans" typeface="Euphemia"/>
+        <a:font script="Cher" typeface="Plantagenet Cherokee"/>
+        <a:font script="Yiii" typeface="Microsoft Yi Baiti"/>
+        <a:font script="Tibt" typeface="Microsoft Himalaya"/>
+        <a:font script="Thaa" typeface="MV Boli"/>
+        <a:font script="Deva" typeface="Mangal"/>
+        <a:font script="Telu" typeface="Gautami"/>
+        <a:font script="Taml" typeface="Latha"/>
+        <a:font script="Syrc" typeface="Estrangelo Edessa"/>
+        <a:font script="Orya" typeface="Kalinga"/>
+        <a:font script="Mlym" typeface="Kartika"/>
+        <a:font script="Laoo" typeface="DokChampa"/>
+        <a:font script="Sinh" typeface="Iskoola Pota"/>
+        <a:font script="Mong" typeface="Mongolian Baiti"/>
+        <a:font script="Viet" typeface="Times New Roman"/>
+        <a:font script="Uigh" typeface="Microsoft Uighur"/>
+        <a:font script="Geor" typeface="Sylfaen"/>
+        <a:font script="Armn" typeface="Arial"/>
+        <a:font script="Bugi" typeface="Leelawadee UI"/>
+        <a:font script="Bopo" typeface="Microsoft JhengHei"/>
+        <a:font script="Java" typeface="Javanese Text"/>
+        <a:font script="Lisu" typeface="Segoe UI"/>
+        <a:font script="Mymr" typeface="Myanmar Text"/>
+        <a:font script="Nkoo" typeface="Ebrima"/>
+        <a:font script="Olck" typeface="Nirmala UI"/>
+        <a:font script="Osma" typeface="Ebrima"/>
+        <a:font script="Phag" typeface="Phagspa"/>
+        <a:font script="Syrn" typeface="Estrangelo Edessa"/>
+        <a:font script="Syrj" typeface="Estrangelo Edessa"/>
+        <a:font script="Syre" typeface="Estrangelo Edessa"/>
+        <a:font script="Sora" typeface="Nirmala UI"/>
+        <a:font script="Tale" typeface="Microsoft Tai Le"/>
+        <a:font script="Talu" typeface="Microsoft New Tai Lue"/>
+        <a:font script="Tfng" typeface="Ebrima"/>
+      </a:majorFont>
+      <a:minorFont>
+        <a:latin typeface="Aptos" panose="02110004020202020204"/>
+        <a:ea typeface=""/>
+        <a:cs typeface=""/>
+        <a:font script="Jpan" typeface="游ゴシック"/>
+        <a:font script="Hang" typeface="맑은 고딕"/>
+        <a:font script="Hans" typeface="等线"/>
+        <a:font script="Hant" typeface="新細明體"/>
+        <a:font script="Arab" typeface="Arial"/>
+        <a:font script="Hebr" typeface="Arial"/>
+        <a:font script="Thai" typeface="Cordia New"/>
+        <a:font script="Ethi" typeface="Nyala"/>
+        <a:font script="Beng" typeface="Vrinda"/>
+        <a:font script="Gujr" typeface="Shruti"/>
+        <a:font script="Khmr" typeface="DaunPenh"/>
+        <a:font script="Knda" typeface="Tunga"/>
+        <a:font script="Guru" typeface="Raavi"/>
+        <a:font script="Cans" typeface="Euphemia"/>
+        <a:font script="Cher" typeface="Plantagenet Cherokee"/>
+        <a:font script="Yiii" typeface="Microsoft Yi Baiti"/>
+        <a:font script="Tibt" typeface="Microsoft Himalaya"/>
+        <a:font script="Thaa" typeface="MV Boli"/>
+        <a:font script="Deva" typeface="Mangal"/>
+        <a:font script="Telu" typeface="Gautami"/>
+        <a:font script="Taml" typeface="Latha"/>
+        <a:font script="Syrc" typeface="Estrangelo Edessa"/>
+        <a:font script="Orya" typeface="Kalinga"/>
+        <a:font script="Mlym" typeface="Kartika"/>
+        <a:font script="Laoo" typeface="DokChampa"/>
+        <a:font script="Sinh" typeface="Iskoola Pota"/>
+        <a:font script="Mong" typeface="Mongolian Baiti"/>
+        <a:font script="Viet" typeface="Arial"/>
+        <a:font script="Uigh" typeface="Microsoft Uighur"/>
+        <a:font script="Geor" typeface="Sylfaen"/>
+        <a:font script="Armn" typeface="Arial"/>
+        <a:font script="Bugi" typeface="Leelawadee UI"/>
+        <a:font script="Bopo" typeface="Microsoft JhengHei"/>
+        <a:font script="Java" typeface="Javanese Text"/>
+        <a:font script="Lisu" typeface="Segoe UI"/>
+        <a:font script="Mymr" typeface="Myanmar Text"/>
+        <a:font script="Nkoo" typeface="Ebrima"/>
+        <a:font script="Olck" typeface="Nirmala UI"/>
+        <a:font script="Osma" typeface="Ebrima"/>
+        <a:font script="Phag" typeface="Phagspa"/>
+        <a:font script="Syrn" typeface="Estrangelo Edessa"/>
+        <a:font script="Syrj" typeface="Estrangelo Edessa"/>
+        <a:font script="Syre" typeface="Estrangelo Edessa"/>
+        <a:font script="Sora" typeface="Nirmala UI"/>
+        <a:font script="Tale" typeface="Microsoft Tai Le"/>
+        <a:font script="Talu" typeface="Microsoft New Tai Lue"/>
+        <a:font script="Tfng" typeface="Ebrima"/>
+      </a:minorFont>
+    </a:fontScheme>
+    <a:fmtScheme name="Office">
+      <a:fillStyleLst>
+        <a:solidFill>
+          <a:schemeClr val="phClr"/>
+        </a:solidFill>
+        <a:gradFill rotWithShape="1">
+          <a:gsLst>
+            <a:gs pos="0">
+              <a:schemeClr val="phClr">
+                <a:lumMod val="110000"/>
+                <a:satMod val="105000"/>
+                <a:tint val="67000"/>
+              </a:schemeClr>
+            </a:gs>
+            <a:gs pos="50000">
+              <a:schemeClr val="phClr">
+                <a:lumMod val="105000"/>
+                <a:satMod val="103000"/>
+                <a:tint val="73000"/>
+              </a:schemeClr>
+            </a:gs>
+            <a:gs pos="100000">
+              <a:schemeClr val="phClr">
+                <a:lumMod val="105000"/>
+                <a:satMod val="109000"/>
+                <a:tint val="81000"/>
+              </a:schemeClr>
+            </a:gs>
+          </a:gsLst>
+          <a:lin ang="5400000" scaled="0"/>
+        </a:gradFill>
+        <a:gradFill rotWithShape="1">
+          <a:gsLst>
+            <a:gs pos="0">
+              <a:schemeClr val="phClr">
+                <a:satMod val="103000"/>
+                <a:lumMod val="102000"/>
+                <a:tint val="94000"/>
+              </a:schemeClr>
+            </a:gs>
+            <a:gs pos="50000">
+              <a:schemeClr val="phClr">
+                <a:satMod val="110000"/>
+                <a:lumMod val="100000"/>
+                <a:shade val="100000"/>
+              </a:schemeClr>
+            </a:gs>
+            <a:gs pos="100000">
+              <a:schemeClr val="phClr">
+                <a:lumMod val="99000"/>
+                <a:satMod val="120000"/>
+                <a:shade val="78000"/>
+              </a:schemeClr>
+            </a:gs>
+          </a:gsLst>
+          <a:lin ang="5400000" scaled="0"/>
+        </a:gradFill>
+      </a:fillStyleLst>
+      <a:lnStyleLst>
+        <a:ln w="12700" cap="flat" cmpd="sng" algn="ctr">
+          <a:solidFill>
+            <a:schemeClr val="phClr"/>
+          </a:solidFill>
+          <a:prstDash val="solid"/>
+          <a:miter lim="800000"/>
+        </a:ln>
+        <a:ln w="19050" cap="flat" cmpd="sng" algn="ctr">
+          <a:solidFill>
+            <a:schemeClr val="phClr"/>
+          </a:solidFill>
+          <a:prstDash val="solid"/>
+          <a:miter lim="800000"/>
+        </a:ln>
+        <a:ln w="25400" cap="flat" cmpd="sng" algn="ctr">
+          <a:solidFill>
+            <a:schemeClr val="phClr"/>
+          </a:solidFill>
+          <a:prstDash val="solid"/>
+          <a:miter lim="800000"/>
+        </a:ln>
+      </a:lnStyleLst>
+      <a:effectStyleLst>
+        <a:effectStyle>
+          <a:effectLst/>
+        </a:effectStyle>
+        <a:effectStyle>
+          <a:effectLst/>
+        </a:effectStyle>
+        <a:effectStyle>
+          <a:effectLst>
+            <a:outerShdw blurRad="57150" dist="19050" dir="5400000" algn="ctr" rotWithShape="0">
+              <a:srgbClr val="000000">
+                <a:alpha val="63000"/>
+              </a:srgbClr>
+            </a:outerShdw>
+          </a:effectLst>
+        </a:effectStyle>
+      </a:effectStyleLst>
+      <a:bgFillStyleLst>
+        <a:solidFill>
+          <a:schemeClr val="phClr"/>
+        </a:solidFill>
+        <a:solidFill>
+          <a:schemeClr val="phClr">
+            <a:tint val="95000"/>
+            <a:satMod val="170000"/>
+          </a:schemeClr>
+        </a:solidFill>
+        <a:gradFill rotWithShape="1">
+          <a:gsLst>
+            <a:gs pos="0">
+              <a:schemeClr val="phClr">
+                <a:tint val="93000"/>
+                <a:satMod val="150000"/>
+                <a:shade val="98000"/>
+                <a:lumMod val="102000"/>
+              </a:schemeClr>
+            </a:gs>
+            <a:gs pos="50000">
+              <a:schemeClr val="phClr">
+                <a:tint val="98000"/>
+                <a:satMod val="130000"/>
+                <a:shade val="90000"/>
+                <a:lumMod val="103000"/>
+              </a:schemeClr>
+            </a:gs>
+            <a:gs pos="100000">
+              <a:schemeClr val="phClr">
+                <a:shade val="63000"/>
+                <a:satMod val="120000"/>
+              </a:schemeClr>
+            </a:gs>
+          </a:gsLst>
+          <a:lin ang="5400000" scaled="0"/>
+        </a:gradFill>
+      </a:bgFillStyleLst>
+    </a:fmtScheme>
+  </a:themeElements>
+  <a:objectDefaults>
+    <a:lnDef>
+      <a:spPr/>
+      <a:bodyPr/>
+      <a:lstStyle/>
+      <a:style>
+        <a:lnRef idx="2">
+          <a:schemeClr val="accent1"/>
+        </a:lnRef>
+        <a:fillRef idx="0">
+          <a:schemeClr val="accent1"/>
+        </a:fillRef>
+        <a:effectRef idx="1">
+          <a:schemeClr val="accent1"/>
+        </a:effectRef>
+        <a:fontRef idx="minor">
+          <a:schemeClr val="tx1"/>
+        </a:fontRef>
+      </a:style>
+    </a:lnDef>
+  </a:objectDefaults>
+  <a:extraClrSchemeLst/>
+  <a:extLst>
+    <a:ext uri="{05A4C25C-085E-4340-85A3-A5531E510DB2}">
+      <thm15:themeFamily xmlns:thm15="http://schemas.microsoft.com/office/thememl/2012/main" name="Office Theme" id="{2E142A2C-CD16-42D6-873A-C26D2A0506FA}" vid="{1BDDFF52-6CD6-40A5-AB3C-68EB2F1E4D0A}"/>
+    </a:ext>
+  </a:extLst>
+</a:theme>
 </file>
</xml_diff>